<commit_message>
adicionando mais slides de Apresentação
</commit_message>
<xml_diff>
--- a/Doc/PPO.pptx
+++ b/Doc/PPO.pptx
@@ -11,6 +11,9 @@
     <p:sldId id="260" r:id="rId5"/>
     <p:sldId id="259" r:id="rId6"/>
     <p:sldId id="261" r:id="rId7"/>
+    <p:sldId id="262" r:id="rId8"/>
+    <p:sldId id="263" r:id="rId9"/>
+    <p:sldId id="264" r:id="rId10"/>
   </p:sldIdLst>
   <p:sldSz cx="12192000" cy="6858000"/>
   <p:notesSz cx="6858000" cy="9144000"/>
@@ -3415,21 +3418,21 @@
           <a:p>
             <a:pPr algn="ctr"/>
             <a:r>
-              <a:rPr lang="pt-BR" dirty="0" smtClean="0"/>
+              <a:rPr lang="pt-BR" b="1" dirty="0" smtClean="0"/>
               <a:t>PPO</a:t>
             </a:r>
             <a:br>
-              <a:rPr lang="pt-BR" dirty="0" smtClean="0"/>
+              <a:rPr lang="pt-BR" b="1" dirty="0" smtClean="0"/>
             </a:br>
             <a:r>
-              <a:rPr lang="pt-BR" dirty="0" err="1" smtClean="0"/>
+              <a:rPr lang="pt-BR" b="1" dirty="0" err="1" smtClean="0"/>
               <a:t>ZonAzul</a:t>
             </a:r>
             <a:r>
-              <a:rPr lang="pt-BR" dirty="0" smtClean="0"/>
+              <a:rPr lang="pt-BR" b="1" dirty="0" smtClean="0"/>
               <a:t> Digital</a:t>
             </a:r>
-            <a:endParaRPr lang="pt-BR" dirty="0"/>
+            <a:endParaRPr lang="pt-BR" b="1" dirty="0"/>
           </a:p>
         </p:txBody>
       </p:sp>
@@ -4010,8 +4013,8 @@
         </p:nvSpPr>
         <p:spPr>
           <a:xfrm>
-            <a:off x="3451534" y="449667"/>
-            <a:ext cx="5113793" cy="1277274"/>
+            <a:off x="3193960" y="449667"/>
+            <a:ext cx="5628945" cy="1277274"/>
           </a:xfrm>
         </p:spPr>
         <p:txBody>
@@ -4047,8 +4050,8 @@
         </p:nvSpPr>
         <p:spPr>
           <a:xfrm>
-            <a:off x="3001213" y="2193829"/>
-            <a:ext cx="6014434" cy="3421359"/>
+            <a:off x="3193961" y="2193829"/>
+            <a:ext cx="5821686" cy="3421359"/>
           </a:xfrm>
         </p:spPr>
         <p:txBody>
@@ -4262,10 +4265,10 @@
           <a:p>
             <a:pPr algn="ctr"/>
             <a:r>
-              <a:rPr lang="pt-BR" sz="4400" dirty="0" smtClean="0"/>
+              <a:rPr lang="pt-BR" sz="4400" b="1" dirty="0" smtClean="0"/>
               <a:t>Fluxo do sistema</a:t>
             </a:r>
-            <a:endParaRPr lang="pt-BR" sz="4400" dirty="0"/>
+            <a:endParaRPr lang="pt-BR" sz="4400" b="1" dirty="0"/>
           </a:p>
         </p:txBody>
       </p:sp>
@@ -4456,8 +4459,8 @@
         </p:blipFill>
         <p:spPr>
           <a:xfrm>
-            <a:off x="5197168" y="3657397"/>
-            <a:ext cx="1230671" cy="696729"/>
+            <a:off x="5058606" y="3588521"/>
+            <a:ext cx="1352331" cy="765605"/>
           </a:xfrm>
           <a:prstGeom prst="rect">
             <a:avLst/>
@@ -4542,6 +4545,9 @@
           <a:prstGeom prst="leftRightArrow">
             <a:avLst/>
           </a:prstGeom>
+          <a:solidFill>
+            <a:schemeClr val="tx2"/>
+          </a:solidFill>
         </p:spPr>
         <p:style>
           <a:lnRef idx="2">
@@ -4582,6 +4588,9 @@
           <a:prstGeom prst="leftRightArrow">
             <a:avLst/>
           </a:prstGeom>
+          <a:solidFill>
+            <a:schemeClr val="tx2"/>
+          </a:solidFill>
         </p:spPr>
         <p:style>
           <a:lnRef idx="2">
@@ -4622,6 +4631,9 @@
           <a:prstGeom prst="leftRightArrow">
             <a:avLst/>
           </a:prstGeom>
+          <a:solidFill>
+            <a:schemeClr val="tx2"/>
+          </a:solidFill>
         </p:spPr>
         <p:style>
           <a:lnRef idx="2">
@@ -4656,12 +4668,15 @@
         </p:nvSpPr>
         <p:spPr>
           <a:xfrm rot="2326990">
-            <a:off x="6325499" y="4550715"/>
-            <a:ext cx="1216152" cy="370041"/>
+            <a:off x="6351401" y="4555190"/>
+            <a:ext cx="1216152" cy="336538"/>
           </a:xfrm>
           <a:prstGeom prst="leftRightArrow">
             <a:avLst/>
           </a:prstGeom>
+          <a:solidFill>
+            <a:schemeClr val="tx2"/>
+          </a:solidFill>
         </p:spPr>
         <p:style>
           <a:lnRef idx="2">
@@ -4725,7 +4740,7 @@
         </p:nvSpPr>
         <p:spPr>
           <a:xfrm>
-            <a:off x="5303402" y="4354126"/>
+            <a:off x="5234121" y="4354126"/>
             <a:ext cx="934038" cy="369332"/>
           </a:xfrm>
           <a:prstGeom prst="rect">
@@ -4836,6 +4851,680 @@
     <p:extLst>
       <p:ext uri="{BB962C8B-B14F-4D97-AF65-F5344CB8AC3E}">
         <p14:creationId xmlns:p14="http://schemas.microsoft.com/office/powerpoint/2010/main" val="2314686043"/>
+      </p:ext>
+    </p:extLst>
+  </p:cSld>
+  <p:clrMapOvr>
+    <a:masterClrMapping/>
+  </p:clrMapOvr>
+  <p:timing>
+    <p:tnLst>
+      <p:par>
+        <p:cTn id="1" dur="indefinite" restart="never" nodeType="tmRoot"/>
+      </p:par>
+    </p:tnLst>
+  </p:timing>
+</p:sld>
+</file>
+
+<file path=ppt/slides/slide7.xml><?xml version="1.0" encoding="utf-8"?>
+<p:sld xmlns:a="http://schemas.openxmlformats.org/drawingml/2006/main" xmlns:r="http://schemas.openxmlformats.org/officeDocument/2006/relationships" xmlns:p="http://schemas.openxmlformats.org/presentationml/2006/main">
+  <p:cSld>
+    <p:spTree>
+      <p:nvGrpSpPr>
+        <p:cNvPr id="1" name=""/>
+        <p:cNvGrpSpPr/>
+        <p:nvPr/>
+      </p:nvGrpSpPr>
+      <p:grpSpPr>
+        <a:xfrm>
+          <a:off x="0" y="0"/>
+          <a:ext cx="0" cy="0"/>
+          <a:chOff x="0" y="0"/>
+          <a:chExt cx="0" cy="0"/>
+        </a:xfrm>
+      </p:grpSpPr>
+      <p:sp>
+        <p:nvSpPr>
+          <p:cNvPr id="2" name="Título 1"/>
+          <p:cNvSpPr>
+            <a:spLocks noGrp="1"/>
+          </p:cNvSpPr>
+          <p:nvPr>
+            <p:ph type="ctrTitle"/>
+          </p:nvPr>
+        </p:nvSpPr>
+        <p:spPr>
+          <a:xfrm>
+            <a:off x="3206840" y="861702"/>
+            <a:ext cx="5139550" cy="787877"/>
+          </a:xfrm>
+        </p:spPr>
+        <p:txBody>
+          <a:bodyPr/>
+          <a:lstStyle/>
+          <a:p>
+            <a:pPr algn="ctr"/>
+            <a:r>
+              <a:rPr lang="pt-BR" sz="4400" b="1" dirty="0" smtClean="0"/>
+              <a:t>Descrição do Sistema</a:t>
+            </a:r>
+            <a:endParaRPr lang="pt-BR" sz="4400" b="1" dirty="0"/>
+          </a:p>
+        </p:txBody>
+      </p:sp>
+      <p:sp>
+        <p:nvSpPr>
+          <p:cNvPr id="3" name="Subtítulo 2"/>
+          <p:cNvSpPr>
+            <a:spLocks noGrp="1"/>
+          </p:cNvSpPr>
+          <p:nvPr>
+            <p:ph type="subTitle" idx="1"/>
+          </p:nvPr>
+        </p:nvSpPr>
+        <p:spPr>
+          <a:xfrm>
+            <a:off x="2381692" y="2142225"/>
+            <a:ext cx="6826103" cy="4231978"/>
+          </a:xfrm>
+        </p:spPr>
+        <p:txBody>
+          <a:bodyPr>
+            <a:normAutofit lnSpcReduction="10000"/>
+          </a:bodyPr>
+          <a:lstStyle/>
+          <a:p>
+            <a:pPr algn="ctr"/>
+            <a:r>
+              <a:rPr lang="pt-BR" b="1" dirty="0" smtClean="0"/>
+              <a:t>Motorista</a:t>
+            </a:r>
+          </a:p>
+          <a:p>
+            <a:pPr marL="457200" indent="-457200">
+              <a:buFont typeface="Arial" panose="020B0604020202020204" pitchFamily="34" charset="0"/>
+              <a:buChar char="•"/>
+            </a:pPr>
+            <a:r>
+              <a:rPr lang="pt-BR" dirty="0" smtClean="0"/>
+              <a:t>Deve cadastrar e fazer </a:t>
+            </a:r>
+            <a:r>
+              <a:rPr lang="pt-BR" dirty="0" err="1" smtClean="0"/>
+              <a:t>login</a:t>
+            </a:r>
+            <a:r>
+              <a:rPr lang="pt-BR" dirty="0" smtClean="0"/>
+              <a:t> no Sistema</a:t>
+            </a:r>
+          </a:p>
+          <a:p>
+            <a:pPr marL="457200" indent="-457200">
+              <a:buFont typeface="Arial" panose="020B0604020202020204" pitchFamily="34" charset="0"/>
+              <a:buChar char="•"/>
+            </a:pPr>
+            <a:r>
+              <a:rPr lang="pt-BR" dirty="0" smtClean="0"/>
+              <a:t>Adquirir os créditos em um ponto de vendas</a:t>
+            </a:r>
+          </a:p>
+          <a:p>
+            <a:pPr marL="457200" indent="-457200">
+              <a:buFont typeface="Arial" panose="020B0604020202020204" pitchFamily="34" charset="0"/>
+              <a:buChar char="•"/>
+            </a:pPr>
+            <a:r>
+              <a:rPr lang="pt-BR" dirty="0"/>
+              <a:t>C</a:t>
+            </a:r>
+            <a:r>
+              <a:rPr lang="pt-BR" dirty="0" smtClean="0"/>
+              <a:t>omprar </a:t>
+            </a:r>
+            <a:r>
+              <a:rPr lang="pt-BR" dirty="0"/>
+              <a:t>o cartão digital</a:t>
+            </a:r>
+            <a:r>
+              <a:rPr lang="pt-BR" dirty="0" smtClean="0"/>
+              <a:t> informando placa do carro e senha</a:t>
+            </a:r>
+          </a:p>
+          <a:p>
+            <a:pPr marL="457200" indent="-457200">
+              <a:buFont typeface="Arial" panose="020B0604020202020204" pitchFamily="34" charset="0"/>
+              <a:buChar char="•"/>
+            </a:pPr>
+            <a:r>
+              <a:rPr lang="pt-BR" dirty="0" smtClean="0"/>
+              <a:t>Visualizar a qualquer momento o tempo restante do seu cartão</a:t>
+            </a:r>
+          </a:p>
+          <a:p>
+            <a:pPr marL="457200" indent="-457200">
+              <a:buFont typeface="Arial" panose="020B0604020202020204" pitchFamily="34" charset="0"/>
+              <a:buChar char="•"/>
+            </a:pPr>
+            <a:endParaRPr lang="pt-BR" dirty="0"/>
+          </a:p>
+        </p:txBody>
+      </p:sp>
+      <p:grpSp>
+        <p:nvGrpSpPr>
+          <p:cNvPr id="4" name="Grupo 3"/>
+          <p:cNvGrpSpPr/>
+          <p:nvPr/>
+        </p:nvGrpSpPr>
+        <p:grpSpPr>
+          <a:xfrm>
+            <a:off x="193181" y="449667"/>
+            <a:ext cx="2743202" cy="1636710"/>
+            <a:chOff x="2987897" y="256483"/>
+            <a:chExt cx="4842456" cy="2569055"/>
+          </a:xfrm>
+        </p:grpSpPr>
+        <p:pic>
+          <p:nvPicPr>
+            <p:cNvPr id="5" name="Imagem 4"/>
+            <p:cNvPicPr>
+              <a:picLocks noChangeAspect="1"/>
+            </p:cNvPicPr>
+            <p:nvPr/>
+          </p:nvPicPr>
+          <p:blipFill>
+            <a:blip r:embed="rId2" cstate="print">
+              <a:extLst>
+                <a:ext uri="{28A0092B-C50C-407E-A947-70E740481C1C}">
+                  <a14:useLocalDpi xmlns:a14="http://schemas.microsoft.com/office/drawing/2010/main" val="0"/>
+                </a:ext>
+              </a:extLst>
+            </a:blip>
+            <a:stretch>
+              <a:fillRect/>
+            </a:stretch>
+          </p:blipFill>
+          <p:spPr>
+            <a:xfrm>
+              <a:off x="4762376" y="256483"/>
+              <a:ext cx="1293498" cy="1293498"/>
+            </a:xfrm>
+            <a:prstGeom prst="rect">
+              <a:avLst/>
+            </a:prstGeom>
+          </p:spPr>
+        </p:pic>
+        <p:pic>
+          <p:nvPicPr>
+            <p:cNvPr id="6" name="Imagem 5"/>
+            <p:cNvPicPr>
+              <a:picLocks noChangeAspect="1"/>
+            </p:cNvPicPr>
+            <p:nvPr/>
+          </p:nvPicPr>
+          <p:blipFill>
+            <a:blip r:embed="rId3">
+              <a:extLst>
+                <a:ext uri="{28A0092B-C50C-407E-A947-70E740481C1C}">
+                  <a14:useLocalDpi xmlns:a14="http://schemas.microsoft.com/office/drawing/2010/main" val="0"/>
+                </a:ext>
+              </a:extLst>
+            </a:blip>
+            <a:stretch>
+              <a:fillRect/>
+            </a:stretch>
+          </p:blipFill>
+          <p:spPr>
+            <a:xfrm>
+              <a:off x="2987897" y="1029762"/>
+              <a:ext cx="4842456" cy="1795776"/>
+            </a:xfrm>
+            <a:prstGeom prst="rect">
+              <a:avLst/>
+            </a:prstGeom>
+          </p:spPr>
+        </p:pic>
+      </p:grpSp>
+    </p:spTree>
+    <p:extLst>
+      <p:ext uri="{BB962C8B-B14F-4D97-AF65-F5344CB8AC3E}">
+        <p14:creationId xmlns:p14="http://schemas.microsoft.com/office/powerpoint/2010/main" val="1042049956"/>
+      </p:ext>
+    </p:extLst>
+  </p:cSld>
+  <p:clrMapOvr>
+    <a:masterClrMapping/>
+  </p:clrMapOvr>
+  <p:timing>
+    <p:tnLst>
+      <p:par>
+        <p:cTn id="1" dur="indefinite" restart="never" nodeType="tmRoot"/>
+      </p:par>
+    </p:tnLst>
+  </p:timing>
+</p:sld>
+</file>
+
+<file path=ppt/slides/slide8.xml><?xml version="1.0" encoding="utf-8"?>
+<p:sld xmlns:a="http://schemas.openxmlformats.org/drawingml/2006/main" xmlns:r="http://schemas.openxmlformats.org/officeDocument/2006/relationships" xmlns:p="http://schemas.openxmlformats.org/presentationml/2006/main">
+  <p:cSld>
+    <p:spTree>
+      <p:nvGrpSpPr>
+        <p:cNvPr id="1" name=""/>
+        <p:cNvGrpSpPr/>
+        <p:nvPr/>
+      </p:nvGrpSpPr>
+      <p:grpSpPr>
+        <a:xfrm>
+          <a:off x="0" y="0"/>
+          <a:ext cx="0" cy="0"/>
+          <a:chOff x="0" y="0"/>
+          <a:chExt cx="0" cy="0"/>
+        </a:xfrm>
+      </p:grpSpPr>
+      <p:grpSp>
+        <p:nvGrpSpPr>
+          <p:cNvPr id="4" name="Grupo 3"/>
+          <p:cNvGrpSpPr/>
+          <p:nvPr/>
+        </p:nvGrpSpPr>
+        <p:grpSpPr>
+          <a:xfrm>
+            <a:off x="193181" y="449667"/>
+            <a:ext cx="2743202" cy="1636710"/>
+            <a:chOff x="2987897" y="256483"/>
+            <a:chExt cx="4842456" cy="2569055"/>
+          </a:xfrm>
+        </p:grpSpPr>
+        <p:pic>
+          <p:nvPicPr>
+            <p:cNvPr id="5" name="Imagem 4"/>
+            <p:cNvPicPr>
+              <a:picLocks noChangeAspect="1"/>
+            </p:cNvPicPr>
+            <p:nvPr/>
+          </p:nvPicPr>
+          <p:blipFill>
+            <a:blip r:embed="rId2" cstate="print">
+              <a:extLst>
+                <a:ext uri="{28A0092B-C50C-407E-A947-70E740481C1C}">
+                  <a14:useLocalDpi xmlns:a14="http://schemas.microsoft.com/office/drawing/2010/main" val="0"/>
+                </a:ext>
+              </a:extLst>
+            </a:blip>
+            <a:stretch>
+              <a:fillRect/>
+            </a:stretch>
+          </p:blipFill>
+          <p:spPr>
+            <a:xfrm>
+              <a:off x="4762376" y="256483"/>
+              <a:ext cx="1293498" cy="1293498"/>
+            </a:xfrm>
+            <a:prstGeom prst="rect">
+              <a:avLst/>
+            </a:prstGeom>
+          </p:spPr>
+        </p:pic>
+        <p:pic>
+          <p:nvPicPr>
+            <p:cNvPr id="6" name="Imagem 5"/>
+            <p:cNvPicPr>
+              <a:picLocks noChangeAspect="1"/>
+            </p:cNvPicPr>
+            <p:nvPr/>
+          </p:nvPicPr>
+          <p:blipFill>
+            <a:blip r:embed="rId3">
+              <a:extLst>
+                <a:ext uri="{28A0092B-C50C-407E-A947-70E740481C1C}">
+                  <a14:useLocalDpi xmlns:a14="http://schemas.microsoft.com/office/drawing/2010/main" val="0"/>
+                </a:ext>
+              </a:extLst>
+            </a:blip>
+            <a:stretch>
+              <a:fillRect/>
+            </a:stretch>
+          </p:blipFill>
+          <p:spPr>
+            <a:xfrm>
+              <a:off x="2987897" y="1029762"/>
+              <a:ext cx="4842456" cy="1795776"/>
+            </a:xfrm>
+            <a:prstGeom prst="rect">
+              <a:avLst/>
+            </a:prstGeom>
+          </p:spPr>
+        </p:pic>
+      </p:grpSp>
+      <p:sp>
+        <p:nvSpPr>
+          <p:cNvPr id="7" name="Título 1"/>
+          <p:cNvSpPr>
+            <a:spLocks noGrp="1"/>
+          </p:cNvSpPr>
+          <p:nvPr>
+            <p:ph type="ctrTitle"/>
+          </p:nvPr>
+        </p:nvSpPr>
+        <p:spPr>
+          <a:xfrm>
+            <a:off x="3206840" y="861702"/>
+            <a:ext cx="5139550" cy="787877"/>
+          </a:xfrm>
+        </p:spPr>
+        <p:txBody>
+          <a:bodyPr/>
+          <a:lstStyle/>
+          <a:p>
+            <a:pPr algn="ctr"/>
+            <a:r>
+              <a:rPr lang="pt-BR" sz="4400" b="1" dirty="0" smtClean="0"/>
+              <a:t>Descrição do Sistema</a:t>
+            </a:r>
+            <a:endParaRPr lang="pt-BR" sz="4400" b="1" dirty="0"/>
+          </a:p>
+        </p:txBody>
+      </p:sp>
+      <p:sp>
+        <p:nvSpPr>
+          <p:cNvPr id="8" name="Subtítulo 2"/>
+          <p:cNvSpPr>
+            <a:spLocks noGrp="1"/>
+          </p:cNvSpPr>
+          <p:nvPr>
+            <p:ph type="subTitle" idx="1"/>
+          </p:nvPr>
+        </p:nvSpPr>
+        <p:spPr>
+          <a:xfrm>
+            <a:off x="2381692" y="2142225"/>
+            <a:ext cx="6826103" cy="4231978"/>
+          </a:xfrm>
+        </p:spPr>
+        <p:txBody>
+          <a:bodyPr>
+            <a:normAutofit/>
+          </a:bodyPr>
+          <a:lstStyle/>
+          <a:p>
+            <a:pPr algn="ctr"/>
+            <a:endParaRPr lang="pt-BR" b="1" dirty="0" smtClean="0"/>
+          </a:p>
+          <a:p>
+            <a:pPr algn="ctr"/>
+            <a:r>
+              <a:rPr lang="pt-BR" b="1" dirty="0" smtClean="0"/>
+              <a:t>Guarda</a:t>
+            </a:r>
+          </a:p>
+          <a:p>
+            <a:pPr marL="457200" indent="-457200">
+              <a:buFont typeface="Arial" panose="020B0604020202020204" pitchFamily="34" charset="0"/>
+              <a:buChar char="•"/>
+            </a:pPr>
+            <a:r>
+              <a:rPr lang="pt-BR" dirty="0" smtClean="0"/>
+              <a:t>Consulta pela placa do carro para saber se o mesmo está com o cartão ativo</a:t>
+            </a:r>
+          </a:p>
+          <a:p>
+            <a:pPr marL="457200" indent="-457200">
+              <a:buFont typeface="Arial" panose="020B0604020202020204" pitchFamily="34" charset="0"/>
+              <a:buChar char="•"/>
+            </a:pPr>
+            <a:r>
+              <a:rPr lang="pt-BR" dirty="0" smtClean="0"/>
+              <a:t>Visualiza o tempo restante do carro</a:t>
+            </a:r>
+          </a:p>
+          <a:p>
+            <a:pPr marL="457200" indent="-457200">
+              <a:buFont typeface="Arial" panose="020B0604020202020204" pitchFamily="34" charset="0"/>
+              <a:buChar char="•"/>
+            </a:pPr>
+            <a:endParaRPr lang="pt-BR" b="1" dirty="0"/>
+          </a:p>
+        </p:txBody>
+      </p:sp>
+    </p:spTree>
+    <p:extLst>
+      <p:ext uri="{BB962C8B-B14F-4D97-AF65-F5344CB8AC3E}">
+        <p14:creationId xmlns:p14="http://schemas.microsoft.com/office/powerpoint/2010/main" val="3912637560"/>
+      </p:ext>
+    </p:extLst>
+  </p:cSld>
+  <p:clrMapOvr>
+    <a:masterClrMapping/>
+  </p:clrMapOvr>
+  <p:timing>
+    <p:tnLst>
+      <p:par>
+        <p:cTn id="1" dur="indefinite" restart="never" nodeType="tmRoot"/>
+      </p:par>
+    </p:tnLst>
+  </p:timing>
+</p:sld>
+</file>
+
+<file path=ppt/slides/slide9.xml><?xml version="1.0" encoding="utf-8"?>
+<p:sld xmlns:a="http://schemas.openxmlformats.org/drawingml/2006/main" xmlns:r="http://schemas.openxmlformats.org/officeDocument/2006/relationships" xmlns:p="http://schemas.openxmlformats.org/presentationml/2006/main">
+  <p:cSld>
+    <p:spTree>
+      <p:nvGrpSpPr>
+        <p:cNvPr id="1" name=""/>
+        <p:cNvGrpSpPr/>
+        <p:nvPr/>
+      </p:nvGrpSpPr>
+      <p:grpSpPr>
+        <a:xfrm>
+          <a:off x="0" y="0"/>
+          <a:ext cx="0" cy="0"/>
+          <a:chOff x="0" y="0"/>
+          <a:chExt cx="0" cy="0"/>
+        </a:xfrm>
+      </p:grpSpPr>
+      <p:grpSp>
+        <p:nvGrpSpPr>
+          <p:cNvPr id="4" name="Grupo 3"/>
+          <p:cNvGrpSpPr/>
+          <p:nvPr/>
+        </p:nvGrpSpPr>
+        <p:grpSpPr>
+          <a:xfrm>
+            <a:off x="193181" y="449667"/>
+            <a:ext cx="2743202" cy="1636710"/>
+            <a:chOff x="2987897" y="256483"/>
+            <a:chExt cx="4842456" cy="2569055"/>
+          </a:xfrm>
+        </p:grpSpPr>
+        <p:pic>
+          <p:nvPicPr>
+            <p:cNvPr id="5" name="Imagem 4"/>
+            <p:cNvPicPr>
+              <a:picLocks noChangeAspect="1"/>
+            </p:cNvPicPr>
+            <p:nvPr/>
+          </p:nvPicPr>
+          <p:blipFill>
+            <a:blip r:embed="rId2" cstate="print">
+              <a:extLst>
+                <a:ext uri="{28A0092B-C50C-407E-A947-70E740481C1C}">
+                  <a14:useLocalDpi xmlns:a14="http://schemas.microsoft.com/office/drawing/2010/main" val="0"/>
+                </a:ext>
+              </a:extLst>
+            </a:blip>
+            <a:stretch>
+              <a:fillRect/>
+            </a:stretch>
+          </p:blipFill>
+          <p:spPr>
+            <a:xfrm>
+              <a:off x="4762376" y="256483"/>
+              <a:ext cx="1293498" cy="1293498"/>
+            </a:xfrm>
+            <a:prstGeom prst="rect">
+              <a:avLst/>
+            </a:prstGeom>
+          </p:spPr>
+        </p:pic>
+        <p:pic>
+          <p:nvPicPr>
+            <p:cNvPr id="6" name="Imagem 5"/>
+            <p:cNvPicPr>
+              <a:picLocks noChangeAspect="1"/>
+            </p:cNvPicPr>
+            <p:nvPr/>
+          </p:nvPicPr>
+          <p:blipFill>
+            <a:blip r:embed="rId3">
+              <a:extLst>
+                <a:ext uri="{28A0092B-C50C-407E-A947-70E740481C1C}">
+                  <a14:useLocalDpi xmlns:a14="http://schemas.microsoft.com/office/drawing/2010/main" val="0"/>
+                </a:ext>
+              </a:extLst>
+            </a:blip>
+            <a:stretch>
+              <a:fillRect/>
+            </a:stretch>
+          </p:blipFill>
+          <p:spPr>
+            <a:xfrm>
+              <a:off x="2987897" y="1029762"/>
+              <a:ext cx="4842456" cy="1795776"/>
+            </a:xfrm>
+            <a:prstGeom prst="rect">
+              <a:avLst/>
+            </a:prstGeom>
+          </p:spPr>
+        </p:pic>
+      </p:grpSp>
+      <p:sp>
+        <p:nvSpPr>
+          <p:cNvPr id="7" name="Título 1"/>
+          <p:cNvSpPr>
+            <a:spLocks noGrp="1"/>
+          </p:cNvSpPr>
+          <p:nvPr>
+            <p:ph type="ctrTitle"/>
+          </p:nvPr>
+        </p:nvSpPr>
+        <p:spPr>
+          <a:xfrm>
+            <a:off x="3206840" y="861702"/>
+            <a:ext cx="5139550" cy="787877"/>
+          </a:xfrm>
+        </p:spPr>
+        <p:txBody>
+          <a:bodyPr/>
+          <a:lstStyle/>
+          <a:p>
+            <a:pPr algn="ctr"/>
+            <a:r>
+              <a:rPr lang="pt-BR" sz="4400" b="1" dirty="0" smtClean="0"/>
+              <a:t>Descrição do Sistema</a:t>
+            </a:r>
+            <a:endParaRPr lang="pt-BR" sz="4400" b="1" dirty="0"/>
+          </a:p>
+        </p:txBody>
+      </p:sp>
+      <p:sp>
+        <p:nvSpPr>
+          <p:cNvPr id="8" name="Subtítulo 2"/>
+          <p:cNvSpPr>
+            <a:spLocks noGrp="1"/>
+          </p:cNvSpPr>
+          <p:nvPr>
+            <p:ph type="subTitle" idx="1"/>
+          </p:nvPr>
+        </p:nvSpPr>
+        <p:spPr>
+          <a:xfrm>
+            <a:off x="2381692" y="2142225"/>
+            <a:ext cx="6826103" cy="4231978"/>
+          </a:xfrm>
+        </p:spPr>
+        <p:txBody>
+          <a:bodyPr>
+            <a:normAutofit/>
+          </a:bodyPr>
+          <a:lstStyle/>
+          <a:p>
+            <a:pPr algn="ctr"/>
+            <a:r>
+              <a:rPr lang="pt-BR" b="1" dirty="0" smtClean="0"/>
+              <a:t>Administrativo</a:t>
+            </a:r>
+          </a:p>
+          <a:p>
+            <a:pPr marL="457200" indent="-457200">
+              <a:buFont typeface="Arial" panose="020B0604020202020204" pitchFamily="34" charset="0"/>
+              <a:buChar char="•"/>
+            </a:pPr>
+            <a:r>
+              <a:rPr lang="pt-BR" dirty="0" smtClean="0"/>
+              <a:t>Deve fazer </a:t>
+            </a:r>
+            <a:r>
+              <a:rPr lang="pt-BR" dirty="0" err="1" smtClean="0"/>
+              <a:t>login</a:t>
+            </a:r>
+            <a:r>
+              <a:rPr lang="pt-BR" dirty="0" smtClean="0"/>
+              <a:t> no Sistema</a:t>
+            </a:r>
+          </a:p>
+          <a:p>
+            <a:pPr marL="457200" indent="-457200">
+              <a:buFont typeface="Arial" panose="020B0604020202020204" pitchFamily="34" charset="0"/>
+              <a:buChar char="•"/>
+            </a:pPr>
+            <a:r>
+              <a:rPr lang="pt-BR" dirty="0" smtClean="0"/>
+              <a:t>Pode cadastrar </a:t>
+            </a:r>
+            <a:r>
+              <a:rPr lang="pt-BR" dirty="0"/>
+              <a:t>motoristas no </a:t>
+            </a:r>
+            <a:r>
+              <a:rPr lang="pt-BR" dirty="0" smtClean="0"/>
+              <a:t>sistema</a:t>
+            </a:r>
+          </a:p>
+          <a:p>
+            <a:pPr marL="457200" indent="-457200">
+              <a:buFont typeface="Arial" panose="020B0604020202020204" pitchFamily="34" charset="0"/>
+              <a:buChar char="•"/>
+            </a:pPr>
+            <a:r>
+              <a:rPr lang="pt-BR" dirty="0" smtClean="0"/>
+              <a:t>Faz a venda dos créditos</a:t>
+            </a:r>
+          </a:p>
+          <a:p>
+            <a:pPr marL="457200" indent="-457200">
+              <a:buFont typeface="Arial" panose="020B0604020202020204" pitchFamily="34" charset="0"/>
+              <a:buChar char="•"/>
+            </a:pPr>
+            <a:r>
+              <a:rPr lang="pt-BR" dirty="0" smtClean="0"/>
+              <a:t>Faz relatório dos cartões vendidos</a:t>
+            </a:r>
+          </a:p>
+          <a:p>
+            <a:pPr marL="457200" indent="-457200">
+              <a:buFont typeface="Arial" panose="020B0604020202020204" pitchFamily="34" charset="0"/>
+              <a:buChar char="•"/>
+            </a:pPr>
+            <a:endParaRPr lang="pt-BR" dirty="0"/>
+          </a:p>
+        </p:txBody>
+      </p:sp>
+    </p:spTree>
+    <p:extLst>
+      <p:ext uri="{BB962C8B-B14F-4D97-AF65-F5344CB8AC3E}">
+        <p14:creationId xmlns:p14="http://schemas.microsoft.com/office/powerpoint/2010/main" val="4053253773"/>
       </p:ext>
     </p:extLst>
   </p:cSld>

</xml_diff>